<commit_message>
as good as it gets, last push
</commit_message>
<xml_diff>
--- a/ppt/convert to pdf.pptx
+++ b/ppt/convert to pdf.pptx
@@ -5,7 +5,9 @@
     <p:sldMasterId id="2147483648" r:id="rId1"/>
   </p:sldMasterIdLst>
   <p:sldIdLst>
-    <p:sldId id="256" r:id="rId2"/>
+    <p:sldId id="257" r:id="rId2"/>
+    <p:sldId id="258" r:id="rId3"/>
+    <p:sldId id="260" r:id="rId4"/>
   </p:sldIdLst>
   <p:sldSz cx="12192000" cy="6858000"/>
   <p:notesSz cx="6858000" cy="9144000"/>
@@ -261,7 +263,7 @@
           <a:p>
             <a:fld id="{4180EA43-58AE-486F-834A-BA37D50DEA6E}" type="datetimeFigureOut">
               <a:rPr lang="en-AU" smtClean="0"/>
-              <a:t>27/03/2020</a:t>
+              <a:t>2/04/2020</a:t>
             </a:fld>
             <a:endParaRPr lang="en-AU"/>
           </a:p>
@@ -461,7 +463,7 @@
           <a:p>
             <a:fld id="{4180EA43-58AE-486F-834A-BA37D50DEA6E}" type="datetimeFigureOut">
               <a:rPr lang="en-AU" smtClean="0"/>
-              <a:t>27/03/2020</a:t>
+              <a:t>2/04/2020</a:t>
             </a:fld>
             <a:endParaRPr lang="en-AU"/>
           </a:p>
@@ -671,7 +673,7 @@
           <a:p>
             <a:fld id="{4180EA43-58AE-486F-834A-BA37D50DEA6E}" type="datetimeFigureOut">
               <a:rPr lang="en-AU" smtClean="0"/>
-              <a:t>27/03/2020</a:t>
+              <a:t>2/04/2020</a:t>
             </a:fld>
             <a:endParaRPr lang="en-AU"/>
           </a:p>
@@ -871,7 +873,7 @@
           <a:p>
             <a:fld id="{4180EA43-58AE-486F-834A-BA37D50DEA6E}" type="datetimeFigureOut">
               <a:rPr lang="en-AU" smtClean="0"/>
-              <a:t>27/03/2020</a:t>
+              <a:t>2/04/2020</a:t>
             </a:fld>
             <a:endParaRPr lang="en-AU"/>
           </a:p>
@@ -1147,7 +1149,7 @@
           <a:p>
             <a:fld id="{4180EA43-58AE-486F-834A-BA37D50DEA6E}" type="datetimeFigureOut">
               <a:rPr lang="en-AU" smtClean="0"/>
-              <a:t>27/03/2020</a:t>
+              <a:t>2/04/2020</a:t>
             </a:fld>
             <a:endParaRPr lang="en-AU"/>
           </a:p>
@@ -1415,7 +1417,7 @@
           <a:p>
             <a:fld id="{4180EA43-58AE-486F-834A-BA37D50DEA6E}" type="datetimeFigureOut">
               <a:rPr lang="en-AU" smtClean="0"/>
-              <a:t>27/03/2020</a:t>
+              <a:t>2/04/2020</a:t>
             </a:fld>
             <a:endParaRPr lang="en-AU"/>
           </a:p>
@@ -1830,7 +1832,7 @@
           <a:p>
             <a:fld id="{4180EA43-58AE-486F-834A-BA37D50DEA6E}" type="datetimeFigureOut">
               <a:rPr lang="en-AU" smtClean="0"/>
-              <a:t>27/03/2020</a:t>
+              <a:t>2/04/2020</a:t>
             </a:fld>
             <a:endParaRPr lang="en-AU"/>
           </a:p>
@@ -1972,7 +1974,7 @@
           <a:p>
             <a:fld id="{4180EA43-58AE-486F-834A-BA37D50DEA6E}" type="datetimeFigureOut">
               <a:rPr lang="en-AU" smtClean="0"/>
-              <a:t>27/03/2020</a:t>
+              <a:t>2/04/2020</a:t>
             </a:fld>
             <a:endParaRPr lang="en-AU"/>
           </a:p>
@@ -2085,7 +2087,7 @@
           <a:p>
             <a:fld id="{4180EA43-58AE-486F-834A-BA37D50DEA6E}" type="datetimeFigureOut">
               <a:rPr lang="en-AU" smtClean="0"/>
-              <a:t>27/03/2020</a:t>
+              <a:t>2/04/2020</a:t>
             </a:fld>
             <a:endParaRPr lang="en-AU"/>
           </a:p>
@@ -2398,7 +2400,7 @@
           <a:p>
             <a:fld id="{4180EA43-58AE-486F-834A-BA37D50DEA6E}" type="datetimeFigureOut">
               <a:rPr lang="en-AU" smtClean="0"/>
-              <a:t>27/03/2020</a:t>
+              <a:t>2/04/2020</a:t>
             </a:fld>
             <a:endParaRPr lang="en-AU"/>
           </a:p>
@@ -2687,7 +2689,7 @@
           <a:p>
             <a:fld id="{4180EA43-58AE-486F-834A-BA37D50DEA6E}" type="datetimeFigureOut">
               <a:rPr lang="en-AU" smtClean="0"/>
-              <a:t>27/03/2020</a:t>
+              <a:t>2/04/2020</a:t>
             </a:fld>
             <a:endParaRPr lang="en-AU"/>
           </a:p>
@@ -2930,7 +2932,7 @@
           <a:p>
             <a:fld id="{4180EA43-58AE-486F-834A-BA37D50DEA6E}" type="datetimeFigureOut">
               <a:rPr lang="en-AU" smtClean="0"/>
-              <a:t>27/03/2020</a:t>
+              <a:t>2/04/2020</a:t>
             </a:fld>
             <a:endParaRPr lang="en-AU"/>
           </a:p>
@@ -3347,12 +3349,72 @@
           <a:chExt cx="0" cy="0"/>
         </a:xfrm>
       </p:grpSpPr>
+      <p:sp>
+        <p:nvSpPr>
+          <p:cNvPr id="2" name="Title 1">
+            <a:extLst>
+              <a:ext uri="{FF2B5EF4-FFF2-40B4-BE49-F238E27FC236}">
+                <a16:creationId xmlns:a16="http://schemas.microsoft.com/office/drawing/2014/main" id="{C1F7AA57-5FB3-4548-95C8-BA8369D68675}"/>
+              </a:ext>
+            </a:extLst>
+          </p:cNvPr>
+          <p:cNvSpPr>
+            <a:spLocks noGrp="1"/>
+          </p:cNvSpPr>
+          <p:nvPr>
+            <p:ph type="title"/>
+          </p:nvPr>
+        </p:nvSpPr>
+        <p:spPr/>
+        <p:txBody>
+          <a:bodyPr/>
+          <a:lstStyle/>
+          <a:p>
+            <a:endParaRPr lang="en-AU"/>
+          </a:p>
+        </p:txBody>
+      </p:sp>
       <p:pic>
         <p:nvPicPr>
-          <p:cNvPr id="8" name="Picture 7">
-            <a:extLst>
-              <a:ext uri="{FF2B5EF4-FFF2-40B4-BE49-F238E27FC236}">
-                <a16:creationId xmlns:a16="http://schemas.microsoft.com/office/drawing/2014/main" id="{D6700214-1467-4FED-8836-E6DA3B5E701C}"/>
+          <p:cNvPr id="5" name="Content Placeholder 4">
+            <a:extLst>
+              <a:ext uri="{FF2B5EF4-FFF2-40B4-BE49-F238E27FC236}">
+                <a16:creationId xmlns:a16="http://schemas.microsoft.com/office/drawing/2014/main" id="{97C232E3-984B-4594-B306-2337DB535BA7}"/>
+              </a:ext>
+            </a:extLst>
+          </p:cNvPr>
+          <p:cNvPicPr>
+            <a:picLocks noGrp="1" noChangeAspect="1"/>
+          </p:cNvPicPr>
+          <p:nvPr>
+            <p:ph idx="1"/>
+          </p:nvPr>
+        </p:nvPicPr>
+        <p:blipFill>
+          <a:blip r:embed="rId2">
+            <a:extLst>
+              <a:ext uri="{28A0092B-C50C-407E-A947-70E740481C1C}">
+                <a14:useLocalDpi xmlns:a14="http://schemas.microsoft.com/office/drawing/2010/main" val="0"/>
+              </a:ext>
+            </a:extLst>
+          </a:blip>
+          <a:stretch>
+            <a:fillRect/>
+          </a:stretch>
+        </p:blipFill>
+        <p:spPr>
+          <a:xfrm>
+            <a:off x="0" y="0"/>
+            <a:ext cx="12192000" cy="6928153"/>
+          </a:xfrm>
+        </p:spPr>
+      </p:pic>
+      <p:pic>
+        <p:nvPicPr>
+          <p:cNvPr id="10" name="Picture 9">
+            <a:extLst>
+              <a:ext uri="{FF2B5EF4-FFF2-40B4-BE49-F238E27FC236}">
+                <a16:creationId xmlns:a16="http://schemas.microsoft.com/office/drawing/2014/main" id="{0B04FC69-FF90-4930-9339-9E0E9CDF5DBD}"/>
               </a:ext>
             </a:extLst>
           </p:cNvPr>
@@ -3362,15 +3424,21 @@
           <p:nvPr/>
         </p:nvPicPr>
         <p:blipFill>
-          <a:blip r:embed="rId2"/>
+          <a:blip r:embed="rId3">
+            <a:extLst>
+              <a:ext uri="{28A0092B-C50C-407E-A947-70E740481C1C}">
+                <a14:useLocalDpi xmlns:a14="http://schemas.microsoft.com/office/drawing/2010/main" val="0"/>
+              </a:ext>
+            </a:extLst>
+          </a:blip>
           <a:stretch>
             <a:fillRect/>
           </a:stretch>
         </p:blipFill>
         <p:spPr>
           <a:xfrm>
-            <a:off x="1524000" y="327026"/>
-            <a:ext cx="8886825" cy="2152650"/>
+            <a:off x="2379335" y="2915624"/>
+            <a:ext cx="6062003" cy="3315592"/>
           </a:xfrm>
           <a:prstGeom prst="rect">
             <a:avLst/>
@@ -3379,925 +3447,710 @@
       </p:pic>
       <p:sp>
         <p:nvSpPr>
-          <p:cNvPr id="2" name="Title 1">
-            <a:extLst>
-              <a:ext uri="{FF2B5EF4-FFF2-40B4-BE49-F238E27FC236}">
-                <a16:creationId xmlns:a16="http://schemas.microsoft.com/office/drawing/2014/main" id="{044A3909-6CD5-4A11-9059-6BD727200504}"/>
-              </a:ext>
-            </a:extLst>
-          </p:cNvPr>
-          <p:cNvSpPr>
-            <a:spLocks noGrp="1"/>
-          </p:cNvSpPr>
-          <p:nvPr>
-            <p:ph type="ctrTitle"/>
-          </p:nvPr>
-        </p:nvSpPr>
-        <p:spPr/>
-        <p:txBody>
-          <a:bodyPr/>
-          <a:lstStyle/>
-          <a:p>
-            <a:endParaRPr lang="en-AU" dirty="0"/>
-          </a:p>
-        </p:txBody>
-      </p:sp>
-      <p:sp>
-        <p:nvSpPr>
-          <p:cNvPr id="3" name="Subtitle 2">
-            <a:extLst>
-              <a:ext uri="{FF2B5EF4-FFF2-40B4-BE49-F238E27FC236}">
-                <a16:creationId xmlns:a16="http://schemas.microsoft.com/office/drawing/2014/main" id="{AAEBC93F-C288-4AE1-A84C-1D6647B1A81A}"/>
-              </a:ext>
-            </a:extLst>
-          </p:cNvPr>
-          <p:cNvSpPr>
-            <a:spLocks noGrp="1"/>
-          </p:cNvSpPr>
-          <p:nvPr>
-            <p:ph type="subTitle" idx="1"/>
-          </p:nvPr>
-        </p:nvSpPr>
-        <p:spPr/>
-        <p:txBody>
-          <a:bodyPr/>
-          <a:lstStyle/>
-          <a:p>
-            <a:endParaRPr lang="en-AU" dirty="0"/>
-          </a:p>
-        </p:txBody>
-      </p:sp>
-      <p:graphicFrame>
-        <p:nvGraphicFramePr>
-          <p:cNvPr id="4" name="Table 3">
-            <a:extLst>
-              <a:ext uri="{FF2B5EF4-FFF2-40B4-BE49-F238E27FC236}">
-                <a16:creationId xmlns:a16="http://schemas.microsoft.com/office/drawing/2014/main" id="{52053B9D-A931-4A43-82A5-498D1245BA2D}"/>
-              </a:ext>
-            </a:extLst>
-          </p:cNvPr>
-          <p:cNvGraphicFramePr>
-            <a:graphicFrameLocks noGrp="1"/>
-          </p:cNvGraphicFramePr>
-          <p:nvPr>
-            <p:extLst>
-              <p:ext uri="{D42A27DB-BD31-4B8C-83A1-F6EECF244321}">
-                <p14:modId xmlns:p14="http://schemas.microsoft.com/office/powerpoint/2010/main" val="4222463332"/>
-              </p:ext>
-            </p:extLst>
-          </p:nvPr>
-        </p:nvGraphicFramePr>
-        <p:xfrm>
-          <a:off x="1524000" y="5890261"/>
-          <a:ext cx="9334660" cy="937260"/>
-        </p:xfrm>
-        <a:graphic>
-          <a:graphicData uri="http://schemas.openxmlformats.org/drawingml/2006/table">
-            <a:tbl>
-              <a:tblPr/>
-              <a:tblGrid>
-                <a:gridCol w="2333665">
-                  <a:extLst>
-                    <a:ext uri="{9D8B030D-6E8A-4147-A177-3AD203B41FA5}">
-                      <a16:colId xmlns:a16="http://schemas.microsoft.com/office/drawing/2014/main" val="212885117"/>
-                    </a:ext>
-                  </a:extLst>
-                </a:gridCol>
-                <a:gridCol w="2333665">
-                  <a:extLst>
-                    <a:ext uri="{9D8B030D-6E8A-4147-A177-3AD203B41FA5}">
-                      <a16:colId xmlns:a16="http://schemas.microsoft.com/office/drawing/2014/main" val="3133131203"/>
-                    </a:ext>
-                  </a:extLst>
-                </a:gridCol>
-                <a:gridCol w="2333665">
-                  <a:extLst>
-                    <a:ext uri="{9D8B030D-6E8A-4147-A177-3AD203B41FA5}">
-                      <a16:colId xmlns:a16="http://schemas.microsoft.com/office/drawing/2014/main" val="2105450346"/>
-                    </a:ext>
-                  </a:extLst>
-                </a:gridCol>
-                <a:gridCol w="2333665">
-                  <a:extLst>
-                    <a:ext uri="{9D8B030D-6E8A-4147-A177-3AD203B41FA5}">
-                      <a16:colId xmlns:a16="http://schemas.microsoft.com/office/drawing/2014/main" val="1682751358"/>
-                    </a:ext>
-                  </a:extLst>
-                </a:gridCol>
-              </a:tblGrid>
-              <a:tr h="0">
-                <a:tc>
-                  <a:txBody>
-                    <a:bodyPr/>
-                    <a:lstStyle/>
-                    <a:p>
-                      <a:r>
-                        <a:rPr lang="en-AU" dirty="0">
-                          <a:effectLst/>
-                        </a:rPr>
-                        <a:t>R9</a:t>
-                      </a:r>
-                    </a:p>
-                  </a:txBody>
-                  <a:tcPr marL="123825" marR="123825" marT="57150" marB="57150" anchor="ctr">
-                    <a:lnL w="9525" cap="flat" cmpd="sng" algn="ctr">
-                      <a:solidFill>
-                        <a:srgbClr val="DFE2E5"/>
-                      </a:solidFill>
-                      <a:prstDash val="solid"/>
-                      <a:round/>
-                      <a:headEnd type="none" w="med" len="med"/>
-                      <a:tailEnd type="none" w="med" len="med"/>
-                    </a:lnL>
-                    <a:lnR w="9525" cap="flat" cmpd="sng" algn="ctr">
-                      <a:solidFill>
-                        <a:srgbClr val="DFE2E5"/>
-                      </a:solidFill>
-                      <a:prstDash val="solid"/>
-                      <a:round/>
-                      <a:headEnd type="none" w="med" len="med"/>
-                      <a:tailEnd type="none" w="med" len="med"/>
-                    </a:lnR>
-                    <a:lnT w="9525" cap="flat" cmpd="sng" algn="ctr">
-                      <a:solidFill>
-                        <a:srgbClr val="DFE2E5"/>
-                      </a:solidFill>
-                      <a:prstDash val="solid"/>
-                      <a:round/>
-                      <a:headEnd type="none" w="med" len="med"/>
-                      <a:tailEnd type="none" w="med" len="med"/>
-                    </a:lnT>
-                    <a:lnB w="9525" cap="flat" cmpd="sng" algn="ctr">
-                      <a:solidFill>
-                        <a:srgbClr val="DFE2E5"/>
-                      </a:solidFill>
-                      <a:prstDash val="solid"/>
-                      <a:round/>
-                      <a:headEnd type="none" w="med" len="med"/>
-                      <a:tailEnd type="none" w="med" len="med"/>
-                    </a:lnB>
-                    <a:solidFill>
-                      <a:srgbClr val="FFFFFF"/>
-                    </a:solidFill>
-                  </a:tcPr>
-                </a:tc>
-                <a:tc>
-                  <a:txBody>
-                    <a:bodyPr/>
-                    <a:lstStyle/>
-                    <a:p>
-                      <a:r>
-                        <a:rPr lang="en-US" dirty="0">
-                          <a:effectLst/>
-                        </a:rPr>
-                        <a:t>A list of components that will be used</a:t>
-                      </a:r>
-                    </a:p>
-                  </a:txBody>
-                  <a:tcPr marL="123825" marR="123825" marT="57150" marB="57150" anchor="ctr">
-                    <a:lnL w="9525" cap="flat" cmpd="sng" algn="ctr">
-                      <a:solidFill>
-                        <a:srgbClr val="DFE2E5"/>
-                      </a:solidFill>
-                      <a:prstDash val="solid"/>
-                      <a:round/>
-                      <a:headEnd type="none" w="med" len="med"/>
-                      <a:tailEnd type="none" w="med" len="med"/>
-                    </a:lnL>
-                    <a:lnR w="9525" cap="flat" cmpd="sng" algn="ctr">
-                      <a:solidFill>
-                        <a:srgbClr val="DFE2E5"/>
-                      </a:solidFill>
-                      <a:prstDash val="solid"/>
-                      <a:round/>
-                      <a:headEnd type="none" w="med" len="med"/>
-                      <a:tailEnd type="none" w="med" len="med"/>
-                    </a:lnR>
-                    <a:lnT w="9525" cap="flat" cmpd="sng" algn="ctr">
-                      <a:solidFill>
-                        <a:srgbClr val="DFE2E5"/>
-                      </a:solidFill>
-                      <a:prstDash val="solid"/>
-                      <a:round/>
-                      <a:headEnd type="none" w="med" len="med"/>
-                      <a:tailEnd type="none" w="med" len="med"/>
-                    </a:lnT>
-                    <a:lnB w="9525" cap="flat" cmpd="sng" algn="ctr">
-                      <a:solidFill>
-                        <a:srgbClr val="DFE2E5"/>
-                      </a:solidFill>
-                      <a:prstDash val="solid"/>
-                      <a:round/>
-                      <a:headEnd type="none" w="med" len="med"/>
-                      <a:tailEnd type="none" w="med" len="med"/>
-                    </a:lnB>
-                    <a:solidFill>
-                      <a:srgbClr val="FFFFFF"/>
-                    </a:solidFill>
-                  </a:tcPr>
-                </a:tc>
-                <a:tc>
-                  <a:txBody>
-                    <a:bodyPr/>
-                    <a:lstStyle/>
-                    <a:p>
-                      <a:r>
-                        <a:rPr lang="en-US">
-                          <a:effectLst/>
-                        </a:rPr>
-                        <a:t>How components and styling will engage the audience</a:t>
-                      </a:r>
-                    </a:p>
-                  </a:txBody>
-                  <a:tcPr marL="123825" marR="123825" marT="57150" marB="57150" anchor="ctr">
-                    <a:lnL w="9525" cap="flat" cmpd="sng" algn="ctr">
-                      <a:solidFill>
-                        <a:srgbClr val="DFE2E5"/>
-                      </a:solidFill>
-                      <a:prstDash val="solid"/>
-                      <a:round/>
-                      <a:headEnd type="none" w="med" len="med"/>
-                      <a:tailEnd type="none" w="med" len="med"/>
-                    </a:lnL>
-                    <a:lnR w="9525" cap="flat" cmpd="sng" algn="ctr">
-                      <a:solidFill>
-                        <a:srgbClr val="DFE2E5"/>
-                      </a:solidFill>
-                      <a:prstDash val="solid"/>
-                      <a:round/>
-                      <a:headEnd type="none" w="med" len="med"/>
-                      <a:tailEnd type="none" w="med" len="med"/>
-                    </a:lnR>
-                    <a:lnT w="9525" cap="flat" cmpd="sng" algn="ctr">
-                      <a:solidFill>
-                        <a:srgbClr val="DFE2E5"/>
-                      </a:solidFill>
-                      <a:prstDash val="solid"/>
-                      <a:round/>
-                      <a:headEnd type="none" w="med" len="med"/>
-                      <a:tailEnd type="none" w="med" len="med"/>
-                    </a:lnT>
-                    <a:lnB w="9525" cap="flat" cmpd="sng" algn="ctr">
-                      <a:solidFill>
-                        <a:srgbClr val="DFE2E5"/>
-                      </a:solidFill>
-                      <a:prstDash val="solid"/>
-                      <a:round/>
-                      <a:headEnd type="none" w="med" len="med"/>
-                      <a:tailEnd type="none" w="med" len="med"/>
-                    </a:lnB>
-                    <a:solidFill>
-                      <a:srgbClr val="FFFFFF"/>
-                    </a:solidFill>
-                  </a:tcPr>
-                </a:tc>
-                <a:tc>
-                  <a:txBody>
-                    <a:bodyPr/>
-                    <a:lstStyle/>
-                    <a:p>
-                      <a:r>
-                        <a:rPr lang="en-AU" dirty="0">
-                          <a:effectLst/>
-                        </a:rPr>
-                        <a:t>6</a:t>
-                      </a:r>
-                    </a:p>
-                  </a:txBody>
-                  <a:tcPr marL="123825" marR="123825" marT="57150" marB="57150" anchor="ctr">
-                    <a:lnL w="9525" cap="flat" cmpd="sng" algn="ctr">
-                      <a:solidFill>
-                        <a:srgbClr val="DFE2E5"/>
-                      </a:solidFill>
-                      <a:prstDash val="solid"/>
-                      <a:round/>
-                      <a:headEnd type="none" w="med" len="med"/>
-                      <a:tailEnd type="none" w="med" len="med"/>
-                    </a:lnL>
-                    <a:lnR w="9525" cap="flat" cmpd="sng" algn="ctr">
-                      <a:solidFill>
-                        <a:srgbClr val="DFE2E5"/>
-                      </a:solidFill>
-                      <a:prstDash val="solid"/>
-                      <a:round/>
-                      <a:headEnd type="none" w="med" len="med"/>
-                      <a:tailEnd type="none" w="med" len="med"/>
-                    </a:lnR>
-                    <a:lnT w="9525" cap="flat" cmpd="sng" algn="ctr">
-                      <a:solidFill>
-                        <a:srgbClr val="DFE2E5"/>
-                      </a:solidFill>
-                      <a:prstDash val="solid"/>
-                      <a:round/>
-                      <a:headEnd type="none" w="med" len="med"/>
-                      <a:tailEnd type="none" w="med" len="med"/>
-                    </a:lnT>
-                    <a:lnB w="9525" cap="flat" cmpd="sng" algn="ctr">
-                      <a:solidFill>
-                        <a:srgbClr val="DFE2E5"/>
-                      </a:solidFill>
-                      <a:prstDash val="solid"/>
-                      <a:round/>
-                      <a:headEnd type="none" w="med" len="med"/>
-                      <a:tailEnd type="none" w="med" len="med"/>
-                    </a:lnB>
-                    <a:solidFill>
-                      <a:srgbClr val="FFFFFF"/>
-                    </a:solidFill>
-                  </a:tcPr>
-                </a:tc>
-                <a:extLst>
-                  <a:ext uri="{0D108BD9-81ED-4DB2-BD59-A6C34878D82A}">
-                    <a16:rowId xmlns:a16="http://schemas.microsoft.com/office/drawing/2014/main" val="1701508615"/>
-                  </a:ext>
-                </a:extLst>
-              </a:tr>
-            </a:tbl>
-          </a:graphicData>
-        </a:graphic>
-      </p:graphicFrame>
-      <p:graphicFrame>
-        <p:nvGraphicFramePr>
-          <p:cNvPr id="5" name="Table 4">
-            <a:extLst>
-              <a:ext uri="{FF2B5EF4-FFF2-40B4-BE49-F238E27FC236}">
-                <a16:creationId xmlns:a16="http://schemas.microsoft.com/office/drawing/2014/main" id="{87B50B18-6539-4357-888B-4D67D9A2DD97}"/>
-              </a:ext>
-            </a:extLst>
-          </p:cNvPr>
-          <p:cNvGraphicFramePr>
-            <a:graphicFrameLocks noGrp="1"/>
-          </p:cNvGraphicFramePr>
-          <p:nvPr>
-            <p:extLst>
-              <p:ext uri="{D42A27DB-BD31-4B8C-83A1-F6EECF244321}">
-                <p14:modId xmlns:p14="http://schemas.microsoft.com/office/powerpoint/2010/main" val="3454334640"/>
-              </p:ext>
-            </p:extLst>
-          </p:nvPr>
-        </p:nvGraphicFramePr>
-        <p:xfrm>
-          <a:off x="1524000" y="4678681"/>
-          <a:ext cx="9334660" cy="1211580"/>
-        </p:xfrm>
-        <a:graphic>
-          <a:graphicData uri="http://schemas.openxmlformats.org/drawingml/2006/table">
-            <a:tbl>
-              <a:tblPr/>
-              <a:tblGrid>
-                <a:gridCol w="2333665">
-                  <a:extLst>
-                    <a:ext uri="{9D8B030D-6E8A-4147-A177-3AD203B41FA5}">
-                      <a16:colId xmlns:a16="http://schemas.microsoft.com/office/drawing/2014/main" val="2741608888"/>
-                    </a:ext>
-                  </a:extLst>
-                </a:gridCol>
-                <a:gridCol w="2333665">
-                  <a:extLst>
-                    <a:ext uri="{9D8B030D-6E8A-4147-A177-3AD203B41FA5}">
-                      <a16:colId xmlns:a16="http://schemas.microsoft.com/office/drawing/2014/main" val="3415396541"/>
-                    </a:ext>
-                  </a:extLst>
-                </a:gridCol>
-                <a:gridCol w="2333665">
-                  <a:extLst>
-                    <a:ext uri="{9D8B030D-6E8A-4147-A177-3AD203B41FA5}">
-                      <a16:colId xmlns:a16="http://schemas.microsoft.com/office/drawing/2014/main" val="2635336669"/>
-                    </a:ext>
-                  </a:extLst>
-                </a:gridCol>
-                <a:gridCol w="2333665">
-                  <a:extLst>
-                    <a:ext uri="{9D8B030D-6E8A-4147-A177-3AD203B41FA5}">
-                      <a16:colId xmlns:a16="http://schemas.microsoft.com/office/drawing/2014/main" val="1856124878"/>
-                    </a:ext>
-                  </a:extLst>
-                </a:gridCol>
-              </a:tblGrid>
-              <a:tr h="0">
-                <a:tc>
-                  <a:txBody>
-                    <a:bodyPr/>
-                    <a:lstStyle/>
-                    <a:p>
-                      <a:r>
-                        <a:rPr lang="en-AU" dirty="0">
-                          <a:effectLst/>
-                        </a:rPr>
-                        <a:t>R8</a:t>
-                      </a:r>
-                    </a:p>
-                  </a:txBody>
-                  <a:tcPr marL="123825" marR="123825" marT="57150" marB="57150" anchor="ctr">
-                    <a:lnL w="9525" cap="flat" cmpd="sng" algn="ctr">
-                      <a:solidFill>
-                        <a:srgbClr val="DFE2E5"/>
-                      </a:solidFill>
-                      <a:prstDash val="solid"/>
-                      <a:round/>
-                      <a:headEnd type="none" w="med" len="med"/>
-                      <a:tailEnd type="none" w="med" len="med"/>
-                    </a:lnL>
-                    <a:lnR w="9525" cap="flat" cmpd="sng" algn="ctr">
-                      <a:solidFill>
-                        <a:srgbClr val="DFE2E5"/>
-                      </a:solidFill>
-                      <a:prstDash val="solid"/>
-                      <a:round/>
-                      <a:headEnd type="none" w="med" len="med"/>
-                      <a:tailEnd type="none" w="med" len="med"/>
-                    </a:lnR>
-                    <a:lnT w="9525" cap="flat" cmpd="sng" algn="ctr">
-                      <a:solidFill>
-                        <a:srgbClr val="DFE2E5"/>
-                      </a:solidFill>
-                      <a:prstDash val="solid"/>
-                      <a:round/>
-                      <a:headEnd type="none" w="med" len="med"/>
-                      <a:tailEnd type="none" w="med" len="med"/>
-                    </a:lnT>
-                    <a:lnB w="9525" cap="flat" cmpd="sng" algn="ctr">
-                      <a:solidFill>
-                        <a:srgbClr val="DFE2E5"/>
-                      </a:solidFill>
-                      <a:prstDash val="solid"/>
-                      <a:round/>
-                      <a:headEnd type="none" w="med" len="med"/>
-                      <a:tailEnd type="none" w="med" len="med"/>
-                    </a:lnB>
-                    <a:solidFill>
-                      <a:srgbClr val="F6F8FA"/>
-                    </a:solidFill>
-                  </a:tcPr>
-                </a:tc>
-                <a:tc>
-                  <a:txBody>
-                    <a:bodyPr/>
-                    <a:lstStyle/>
-                    <a:p>
-                      <a:r>
-                        <a:rPr lang="en-US">
-                          <a:effectLst/>
-                        </a:rPr>
-                        <a:t>Wireframes or mockups of the pages of your website</a:t>
-                      </a:r>
-                    </a:p>
-                  </a:txBody>
-                  <a:tcPr marL="123825" marR="123825" marT="57150" marB="57150" anchor="ctr">
-                    <a:lnL w="9525" cap="flat" cmpd="sng" algn="ctr">
-                      <a:solidFill>
-                        <a:srgbClr val="DFE2E5"/>
-                      </a:solidFill>
-                      <a:prstDash val="solid"/>
-                      <a:round/>
-                      <a:headEnd type="none" w="med" len="med"/>
-                      <a:tailEnd type="none" w="med" len="med"/>
-                    </a:lnL>
-                    <a:lnR w="9525" cap="flat" cmpd="sng" algn="ctr">
-                      <a:solidFill>
-                        <a:srgbClr val="DFE2E5"/>
-                      </a:solidFill>
-                      <a:prstDash val="solid"/>
-                      <a:round/>
-                      <a:headEnd type="none" w="med" len="med"/>
-                      <a:tailEnd type="none" w="med" len="med"/>
-                    </a:lnR>
-                    <a:lnT w="9525" cap="flat" cmpd="sng" algn="ctr">
-                      <a:solidFill>
-                        <a:srgbClr val="DFE2E5"/>
-                      </a:solidFill>
-                      <a:prstDash val="solid"/>
-                      <a:round/>
-                      <a:headEnd type="none" w="med" len="med"/>
-                      <a:tailEnd type="none" w="med" len="med"/>
-                    </a:lnT>
-                    <a:lnB w="9525" cap="flat" cmpd="sng" algn="ctr">
-                      <a:solidFill>
-                        <a:srgbClr val="DFE2E5"/>
-                      </a:solidFill>
-                      <a:prstDash val="solid"/>
-                      <a:round/>
-                      <a:headEnd type="none" w="med" len="med"/>
-                      <a:tailEnd type="none" w="med" len="med"/>
-                    </a:lnB>
-                    <a:solidFill>
-                      <a:srgbClr val="F6F8FA"/>
-                    </a:solidFill>
-                  </a:tcPr>
-                </a:tc>
-                <a:tc>
-                  <a:txBody>
-                    <a:bodyPr/>
-                    <a:lstStyle/>
-                    <a:p>
-                      <a:r>
-                        <a:rPr lang="en-US">
-                          <a:effectLst/>
-                        </a:rPr>
-                        <a:t>Your decision making process relating to the overall aesthetic of your website</a:t>
-                      </a:r>
-                    </a:p>
-                  </a:txBody>
-                  <a:tcPr marL="123825" marR="123825" marT="57150" marB="57150" anchor="ctr">
-                    <a:lnL w="9525" cap="flat" cmpd="sng" algn="ctr">
-                      <a:solidFill>
-                        <a:srgbClr val="DFE2E5"/>
-                      </a:solidFill>
-                      <a:prstDash val="solid"/>
-                      <a:round/>
-                      <a:headEnd type="none" w="med" len="med"/>
-                      <a:tailEnd type="none" w="med" len="med"/>
-                    </a:lnL>
-                    <a:lnR w="9525" cap="flat" cmpd="sng" algn="ctr">
-                      <a:solidFill>
-                        <a:srgbClr val="DFE2E5"/>
-                      </a:solidFill>
-                      <a:prstDash val="solid"/>
-                      <a:round/>
-                      <a:headEnd type="none" w="med" len="med"/>
-                      <a:tailEnd type="none" w="med" len="med"/>
-                    </a:lnR>
-                    <a:lnT w="9525" cap="flat" cmpd="sng" algn="ctr">
-                      <a:solidFill>
-                        <a:srgbClr val="DFE2E5"/>
-                      </a:solidFill>
-                      <a:prstDash val="solid"/>
-                      <a:round/>
-                      <a:headEnd type="none" w="med" len="med"/>
-                      <a:tailEnd type="none" w="med" len="med"/>
-                    </a:lnT>
-                    <a:lnB w="9525" cap="flat" cmpd="sng" algn="ctr">
-                      <a:solidFill>
-                        <a:srgbClr val="DFE2E5"/>
-                      </a:solidFill>
-                      <a:prstDash val="solid"/>
-                      <a:round/>
-                      <a:headEnd type="none" w="med" len="med"/>
-                      <a:tailEnd type="none" w="med" len="med"/>
-                    </a:lnB>
-                    <a:solidFill>
-                      <a:srgbClr val="F6F8FA"/>
-                    </a:solidFill>
-                  </a:tcPr>
-                </a:tc>
-                <a:tc>
-                  <a:txBody>
-                    <a:bodyPr/>
-                    <a:lstStyle/>
-                    <a:p>
-                      <a:r>
-                        <a:rPr lang="en-AU" dirty="0">
-                          <a:effectLst/>
-                        </a:rPr>
-                        <a:t>6</a:t>
-                      </a:r>
-                    </a:p>
-                  </a:txBody>
-                  <a:tcPr marL="123825" marR="123825" marT="57150" marB="57150" anchor="ctr">
-                    <a:lnL w="9525" cap="flat" cmpd="sng" algn="ctr">
-                      <a:solidFill>
-                        <a:srgbClr val="DFE2E5"/>
-                      </a:solidFill>
-                      <a:prstDash val="solid"/>
-                      <a:round/>
-                      <a:headEnd type="none" w="med" len="med"/>
-                      <a:tailEnd type="none" w="med" len="med"/>
-                    </a:lnL>
-                    <a:lnR w="9525" cap="flat" cmpd="sng" algn="ctr">
-                      <a:solidFill>
-                        <a:srgbClr val="DFE2E5"/>
-                      </a:solidFill>
-                      <a:prstDash val="solid"/>
-                      <a:round/>
-                      <a:headEnd type="none" w="med" len="med"/>
-                      <a:tailEnd type="none" w="med" len="med"/>
-                    </a:lnR>
-                    <a:lnT w="9525" cap="flat" cmpd="sng" algn="ctr">
-                      <a:solidFill>
-                        <a:srgbClr val="DFE2E5"/>
-                      </a:solidFill>
-                      <a:prstDash val="solid"/>
-                      <a:round/>
-                      <a:headEnd type="none" w="med" len="med"/>
-                      <a:tailEnd type="none" w="med" len="med"/>
-                    </a:lnT>
-                    <a:lnB w="9525" cap="flat" cmpd="sng" algn="ctr">
-                      <a:solidFill>
-                        <a:srgbClr val="DFE2E5"/>
-                      </a:solidFill>
-                      <a:prstDash val="solid"/>
-                      <a:round/>
-                      <a:headEnd type="none" w="med" len="med"/>
-                      <a:tailEnd type="none" w="med" len="med"/>
-                    </a:lnB>
-                    <a:solidFill>
-                      <a:srgbClr val="F6F8FA"/>
-                    </a:solidFill>
-                  </a:tcPr>
-                </a:tc>
-                <a:extLst>
-                  <a:ext uri="{0D108BD9-81ED-4DB2-BD59-A6C34878D82A}">
-                    <a16:rowId xmlns:a16="http://schemas.microsoft.com/office/drawing/2014/main" val="628856624"/>
-                  </a:ext>
-                </a:extLst>
-              </a:tr>
-            </a:tbl>
-          </a:graphicData>
-        </a:graphic>
-      </p:graphicFrame>
-      <p:graphicFrame>
-        <p:nvGraphicFramePr>
-          <p:cNvPr id="6" name="Table 5">
-            <a:extLst>
-              <a:ext uri="{FF2B5EF4-FFF2-40B4-BE49-F238E27FC236}">
-                <a16:creationId xmlns:a16="http://schemas.microsoft.com/office/drawing/2014/main" id="{7FF58696-505B-4A03-B305-30AA8699BDBA}"/>
-              </a:ext>
-            </a:extLst>
-          </p:cNvPr>
-          <p:cNvGraphicFramePr>
-            <a:graphicFrameLocks noGrp="1"/>
-          </p:cNvGraphicFramePr>
-          <p:nvPr>
-            <p:extLst>
-              <p:ext uri="{D42A27DB-BD31-4B8C-83A1-F6EECF244321}">
-                <p14:modId xmlns:p14="http://schemas.microsoft.com/office/powerpoint/2010/main" val="2128423687"/>
-              </p:ext>
-            </p:extLst>
-          </p:nvPr>
-        </p:nvGraphicFramePr>
-        <p:xfrm>
-          <a:off x="1524000" y="3467101"/>
-          <a:ext cx="9334660" cy="1211580"/>
-        </p:xfrm>
-        <a:graphic>
-          <a:graphicData uri="http://schemas.openxmlformats.org/drawingml/2006/table">
-            <a:tbl>
-              <a:tblPr/>
-              <a:tblGrid>
-                <a:gridCol w="2333665">
-                  <a:extLst>
-                    <a:ext uri="{9D8B030D-6E8A-4147-A177-3AD203B41FA5}">
-                      <a16:colId xmlns:a16="http://schemas.microsoft.com/office/drawing/2014/main" val="3515749766"/>
-                    </a:ext>
-                  </a:extLst>
-                </a:gridCol>
-                <a:gridCol w="2333665">
-                  <a:extLst>
-                    <a:ext uri="{9D8B030D-6E8A-4147-A177-3AD203B41FA5}">
-                      <a16:colId xmlns:a16="http://schemas.microsoft.com/office/drawing/2014/main" val="3344864913"/>
-                    </a:ext>
-                  </a:extLst>
-                </a:gridCol>
-                <a:gridCol w="2333665">
-                  <a:extLst>
-                    <a:ext uri="{9D8B030D-6E8A-4147-A177-3AD203B41FA5}">
-                      <a16:colId xmlns:a16="http://schemas.microsoft.com/office/drawing/2014/main" val="2949128690"/>
-                    </a:ext>
-                  </a:extLst>
-                </a:gridCol>
-                <a:gridCol w="2333665">
-                  <a:extLst>
-                    <a:ext uri="{9D8B030D-6E8A-4147-A177-3AD203B41FA5}">
-                      <a16:colId xmlns:a16="http://schemas.microsoft.com/office/drawing/2014/main" val="1399989784"/>
-                    </a:ext>
-                  </a:extLst>
-                </a:gridCol>
-              </a:tblGrid>
-              <a:tr h="0">
-                <a:tc>
-                  <a:txBody>
-                    <a:bodyPr/>
-                    <a:lstStyle/>
-                    <a:p>
-                      <a:r>
-                        <a:rPr lang="en-AU" dirty="0">
-                          <a:effectLst/>
-                        </a:rPr>
-                        <a:t>R7</a:t>
-                      </a:r>
-                    </a:p>
-                  </a:txBody>
-                  <a:tcPr marL="123825" marR="123825" marT="57150" marB="57150" anchor="ctr">
-                    <a:lnL w="9525" cap="flat" cmpd="sng" algn="ctr">
-                      <a:solidFill>
-                        <a:srgbClr val="DFE2E5"/>
-                      </a:solidFill>
-                      <a:prstDash val="solid"/>
-                      <a:round/>
-                      <a:headEnd type="none" w="med" len="med"/>
-                      <a:tailEnd type="none" w="med" len="med"/>
-                    </a:lnL>
-                    <a:lnR w="9525" cap="flat" cmpd="sng" algn="ctr">
-                      <a:solidFill>
-                        <a:srgbClr val="DFE2E5"/>
-                      </a:solidFill>
-                      <a:prstDash val="solid"/>
-                      <a:round/>
-                      <a:headEnd type="none" w="med" len="med"/>
-                      <a:tailEnd type="none" w="med" len="med"/>
-                    </a:lnR>
-                    <a:lnT w="9525" cap="flat" cmpd="sng" algn="ctr">
-                      <a:solidFill>
-                        <a:srgbClr val="DFE2E5"/>
-                      </a:solidFill>
-                      <a:prstDash val="solid"/>
-                      <a:round/>
-                      <a:headEnd type="none" w="med" len="med"/>
-                      <a:tailEnd type="none" w="med" len="med"/>
-                    </a:lnT>
-                    <a:lnB w="9525" cap="flat" cmpd="sng" algn="ctr">
-                      <a:solidFill>
-                        <a:srgbClr val="DFE2E5"/>
-                      </a:solidFill>
-                      <a:prstDash val="solid"/>
-                      <a:round/>
-                      <a:headEnd type="none" w="med" len="med"/>
-                      <a:tailEnd type="none" w="med" len="med"/>
-                    </a:lnB>
-                    <a:solidFill>
-                      <a:srgbClr val="FFFFFF"/>
-                    </a:solidFill>
-                  </a:tcPr>
-                </a:tc>
-                <a:tc>
-                  <a:txBody>
-                    <a:bodyPr/>
-                    <a:lstStyle/>
-                    <a:p>
-                      <a:r>
-                        <a:rPr lang="en-US">
-                          <a:effectLst/>
-                        </a:rPr>
-                        <a:t>An overview/sitemap of all the pages on your website</a:t>
-                      </a:r>
-                    </a:p>
-                  </a:txBody>
-                  <a:tcPr marL="123825" marR="123825" marT="57150" marB="57150" anchor="ctr">
-                    <a:lnL w="9525" cap="flat" cmpd="sng" algn="ctr">
-                      <a:solidFill>
-                        <a:srgbClr val="DFE2E5"/>
-                      </a:solidFill>
-                      <a:prstDash val="solid"/>
-                      <a:round/>
-                      <a:headEnd type="none" w="med" len="med"/>
-                      <a:tailEnd type="none" w="med" len="med"/>
-                    </a:lnL>
-                    <a:lnR w="9525" cap="flat" cmpd="sng" algn="ctr">
-                      <a:solidFill>
-                        <a:srgbClr val="DFE2E5"/>
-                      </a:solidFill>
-                      <a:prstDash val="solid"/>
-                      <a:round/>
-                      <a:headEnd type="none" w="med" len="med"/>
-                      <a:tailEnd type="none" w="med" len="med"/>
-                    </a:lnR>
-                    <a:lnT w="9525" cap="flat" cmpd="sng" algn="ctr">
-                      <a:solidFill>
-                        <a:srgbClr val="DFE2E5"/>
-                      </a:solidFill>
-                      <a:prstDash val="solid"/>
-                      <a:round/>
-                      <a:headEnd type="none" w="med" len="med"/>
-                      <a:tailEnd type="none" w="med" len="med"/>
-                    </a:lnT>
-                    <a:lnB w="9525" cap="flat" cmpd="sng" algn="ctr">
-                      <a:solidFill>
-                        <a:srgbClr val="DFE2E5"/>
-                      </a:solidFill>
-                      <a:prstDash val="solid"/>
-                      <a:round/>
-                      <a:headEnd type="none" w="med" len="med"/>
-                      <a:tailEnd type="none" w="med" len="med"/>
-                    </a:lnB>
-                    <a:solidFill>
-                      <a:srgbClr val="FFFFFF"/>
-                    </a:solidFill>
-                  </a:tcPr>
-                </a:tc>
-                <a:tc>
-                  <a:txBody>
-                    <a:bodyPr/>
-                    <a:lstStyle/>
-                    <a:p>
-                      <a:r>
-                        <a:rPr lang="en-US">
-                          <a:effectLst/>
-                        </a:rPr>
-                        <a:t>The overall structure of your website and how different pages will be navigated</a:t>
-                      </a:r>
-                    </a:p>
-                  </a:txBody>
-                  <a:tcPr marL="123825" marR="123825" marT="57150" marB="57150" anchor="ctr">
-                    <a:lnL w="9525" cap="flat" cmpd="sng" algn="ctr">
-                      <a:solidFill>
-                        <a:srgbClr val="DFE2E5"/>
-                      </a:solidFill>
-                      <a:prstDash val="solid"/>
-                      <a:round/>
-                      <a:headEnd type="none" w="med" len="med"/>
-                      <a:tailEnd type="none" w="med" len="med"/>
-                    </a:lnL>
-                    <a:lnR w="9525" cap="flat" cmpd="sng" algn="ctr">
-                      <a:solidFill>
-                        <a:srgbClr val="DFE2E5"/>
-                      </a:solidFill>
-                      <a:prstDash val="solid"/>
-                      <a:round/>
-                      <a:headEnd type="none" w="med" len="med"/>
-                      <a:tailEnd type="none" w="med" len="med"/>
-                    </a:lnR>
-                    <a:lnT w="9525" cap="flat" cmpd="sng" algn="ctr">
-                      <a:solidFill>
-                        <a:srgbClr val="DFE2E5"/>
-                      </a:solidFill>
-                      <a:prstDash val="solid"/>
-                      <a:round/>
-                      <a:headEnd type="none" w="med" len="med"/>
-                      <a:tailEnd type="none" w="med" len="med"/>
-                    </a:lnT>
-                    <a:lnB w="9525" cap="flat" cmpd="sng" algn="ctr">
-                      <a:solidFill>
-                        <a:srgbClr val="DFE2E5"/>
-                      </a:solidFill>
-                      <a:prstDash val="solid"/>
-                      <a:round/>
-                      <a:headEnd type="none" w="med" len="med"/>
-                      <a:tailEnd type="none" w="med" len="med"/>
-                    </a:lnB>
-                    <a:solidFill>
-                      <a:srgbClr val="FFFFFF"/>
-                    </a:solidFill>
-                  </a:tcPr>
-                </a:tc>
-                <a:tc>
-                  <a:txBody>
-                    <a:bodyPr/>
-                    <a:lstStyle/>
-                    <a:p>
-                      <a:r>
-                        <a:rPr lang="en-AU" dirty="0">
-                          <a:effectLst/>
-                        </a:rPr>
-                        <a:t>6</a:t>
-                      </a:r>
-                    </a:p>
-                  </a:txBody>
-                  <a:tcPr marL="123825" marR="123825" marT="57150" marB="57150" anchor="ctr">
-                    <a:lnL w="9525" cap="flat" cmpd="sng" algn="ctr">
-                      <a:solidFill>
-                        <a:srgbClr val="DFE2E5"/>
-                      </a:solidFill>
-                      <a:prstDash val="solid"/>
-                      <a:round/>
-                      <a:headEnd type="none" w="med" len="med"/>
-                      <a:tailEnd type="none" w="med" len="med"/>
-                    </a:lnL>
-                    <a:lnR w="9525" cap="flat" cmpd="sng" algn="ctr">
-                      <a:solidFill>
-                        <a:srgbClr val="DFE2E5"/>
-                      </a:solidFill>
-                      <a:prstDash val="solid"/>
-                      <a:round/>
-                      <a:headEnd type="none" w="med" len="med"/>
-                      <a:tailEnd type="none" w="med" len="med"/>
-                    </a:lnR>
-                    <a:lnT w="9525" cap="flat" cmpd="sng" algn="ctr">
-                      <a:solidFill>
-                        <a:srgbClr val="DFE2E5"/>
-                      </a:solidFill>
-                      <a:prstDash val="solid"/>
-                      <a:round/>
-                      <a:headEnd type="none" w="med" len="med"/>
-                      <a:tailEnd type="none" w="med" len="med"/>
-                    </a:lnT>
-                    <a:lnB w="9525" cap="flat" cmpd="sng" algn="ctr">
-                      <a:solidFill>
-                        <a:srgbClr val="DFE2E5"/>
-                      </a:solidFill>
-                      <a:prstDash val="solid"/>
-                      <a:round/>
-                      <a:headEnd type="none" w="med" len="med"/>
-                      <a:tailEnd type="none" w="med" len="med"/>
-                    </a:lnB>
-                    <a:solidFill>
-                      <a:srgbClr val="FFFFFF"/>
-                    </a:solidFill>
-                  </a:tcPr>
-                </a:tc>
-                <a:extLst>
-                  <a:ext uri="{0D108BD9-81ED-4DB2-BD59-A6C34878D82A}">
-                    <a16:rowId xmlns:a16="http://schemas.microsoft.com/office/drawing/2014/main" val="3391497905"/>
-                  </a:ext>
-                </a:extLst>
-              </a:tr>
-            </a:tbl>
-          </a:graphicData>
-        </a:graphic>
-      </p:graphicFrame>
+          <p:cNvPr id="11" name="TextBox 10">
+            <a:extLst>
+              <a:ext uri="{FF2B5EF4-FFF2-40B4-BE49-F238E27FC236}">
+                <a16:creationId xmlns:a16="http://schemas.microsoft.com/office/drawing/2014/main" id="{0D3F7FDA-C0B3-43E6-9989-DB4204A6A65D}"/>
+              </a:ext>
+            </a:extLst>
+          </p:cNvPr>
+          <p:cNvSpPr txBox="1"/>
+          <p:nvPr/>
+        </p:nvSpPr>
+        <p:spPr>
+          <a:xfrm>
+            <a:off x="4158155" y="77138"/>
+            <a:ext cx="5076497" cy="707886"/>
+          </a:xfrm>
+          <a:prstGeom prst="rect">
+            <a:avLst/>
+          </a:prstGeom>
+          <a:noFill/>
+        </p:spPr>
+        <p:txBody>
+          <a:bodyPr wrap="square" rtlCol="0">
+            <a:spAutoFit/>
+          </a:bodyPr>
+          <a:lstStyle/>
+          <a:p>
+            <a:r>
+              <a:rPr lang="en-US" sz="4000" dirty="0"/>
+              <a:t>Portfolio</a:t>
+            </a:r>
+            <a:endParaRPr lang="en-AU" sz="4000" dirty="0"/>
+          </a:p>
+        </p:txBody>
+      </p:sp>
+      <p:sp>
+        <p:nvSpPr>
+          <p:cNvPr id="12" name="TextBox 11">
+            <a:extLst>
+              <a:ext uri="{FF2B5EF4-FFF2-40B4-BE49-F238E27FC236}">
+                <a16:creationId xmlns:a16="http://schemas.microsoft.com/office/drawing/2014/main" id="{2F578827-4EB9-4754-8B0A-37D9FA308779}"/>
+              </a:ext>
+            </a:extLst>
+          </p:cNvPr>
+          <p:cNvSpPr txBox="1"/>
+          <p:nvPr/>
+        </p:nvSpPr>
+        <p:spPr>
+          <a:xfrm>
+            <a:off x="4472200" y="1204922"/>
+            <a:ext cx="3121573" cy="1200329"/>
+          </a:xfrm>
+          <a:prstGeom prst="rect">
+            <a:avLst/>
+          </a:prstGeom>
+          <a:noFill/>
+        </p:spPr>
+        <p:txBody>
+          <a:bodyPr wrap="square" rtlCol="0">
+            <a:spAutoFit/>
+          </a:bodyPr>
+          <a:lstStyle/>
+          <a:p>
+            <a:pPr marL="285750" indent="-285750">
+              <a:buFontTx/>
+              <a:buChar char="-"/>
+            </a:pPr>
+            <a:r>
+              <a:rPr lang="en-US" sz="2400" dirty="0"/>
+              <a:t>Walkthrough, </a:t>
+            </a:r>
+          </a:p>
+          <a:p>
+            <a:pPr marL="285750" indent="-285750">
+              <a:buFontTx/>
+              <a:buChar char="-"/>
+            </a:pPr>
+            <a:r>
+              <a:rPr lang="en-US" sz="2400" dirty="0"/>
+              <a:t>Overview of sitemap and all pages</a:t>
+            </a:r>
+            <a:endParaRPr lang="en-AU" sz="2400" dirty="0"/>
+          </a:p>
+        </p:txBody>
+      </p:sp>
     </p:spTree>
     <p:extLst>
       <p:ext uri="{BB962C8B-B14F-4D97-AF65-F5344CB8AC3E}">
-        <p14:creationId xmlns:p14="http://schemas.microsoft.com/office/powerpoint/2010/main" val="1726836069"/>
+        <p14:creationId xmlns:p14="http://schemas.microsoft.com/office/powerpoint/2010/main" val="3365108132"/>
+      </p:ext>
+    </p:extLst>
+  </p:cSld>
+  <p:clrMapOvr>
+    <a:masterClrMapping/>
+  </p:clrMapOvr>
+</p:sld>
+</file>
+
+<file path=ppt/slides/slide2.xml><?xml version="1.0" encoding="utf-8"?>
+<p:sld xmlns:a="http://schemas.openxmlformats.org/drawingml/2006/main" xmlns:r="http://schemas.openxmlformats.org/officeDocument/2006/relationships" xmlns:p="http://schemas.openxmlformats.org/presentationml/2006/main">
+  <p:cSld>
+    <p:spTree>
+      <p:nvGrpSpPr>
+        <p:cNvPr id="1" name=""/>
+        <p:cNvGrpSpPr/>
+        <p:nvPr/>
+      </p:nvGrpSpPr>
+      <p:grpSpPr>
+        <a:xfrm>
+          <a:off x="0" y="0"/>
+          <a:ext cx="0" cy="0"/>
+          <a:chOff x="0" y="0"/>
+          <a:chExt cx="0" cy="0"/>
+        </a:xfrm>
+      </p:grpSpPr>
+      <p:sp>
+        <p:nvSpPr>
+          <p:cNvPr id="2" name="Title 1">
+            <a:extLst>
+              <a:ext uri="{FF2B5EF4-FFF2-40B4-BE49-F238E27FC236}">
+                <a16:creationId xmlns:a16="http://schemas.microsoft.com/office/drawing/2014/main" id="{C1F7AA57-5FB3-4548-95C8-BA8369D68675}"/>
+              </a:ext>
+            </a:extLst>
+          </p:cNvPr>
+          <p:cNvSpPr>
+            <a:spLocks noGrp="1"/>
+          </p:cNvSpPr>
+          <p:nvPr>
+            <p:ph type="title"/>
+          </p:nvPr>
+        </p:nvSpPr>
+        <p:spPr/>
+        <p:txBody>
+          <a:bodyPr/>
+          <a:lstStyle/>
+          <a:p>
+            <a:endParaRPr lang="en-AU"/>
+          </a:p>
+        </p:txBody>
+      </p:sp>
+      <p:pic>
+        <p:nvPicPr>
+          <p:cNvPr id="5" name="Content Placeholder 4">
+            <a:extLst>
+              <a:ext uri="{FF2B5EF4-FFF2-40B4-BE49-F238E27FC236}">
+                <a16:creationId xmlns:a16="http://schemas.microsoft.com/office/drawing/2014/main" id="{97C232E3-984B-4594-B306-2337DB535BA7}"/>
+              </a:ext>
+            </a:extLst>
+          </p:cNvPr>
+          <p:cNvPicPr>
+            <a:picLocks noGrp="1" noChangeAspect="1"/>
+          </p:cNvPicPr>
+          <p:nvPr>
+            <p:ph idx="1"/>
+          </p:nvPr>
+        </p:nvPicPr>
+        <p:blipFill>
+          <a:blip r:embed="rId2">
+            <a:extLst>
+              <a:ext uri="{28A0092B-C50C-407E-A947-70E740481C1C}">
+                <a14:useLocalDpi xmlns:a14="http://schemas.microsoft.com/office/drawing/2010/main" val="0"/>
+              </a:ext>
+            </a:extLst>
+          </a:blip>
+          <a:stretch>
+            <a:fillRect/>
+          </a:stretch>
+        </p:blipFill>
+        <p:spPr>
+          <a:xfrm>
+            <a:off x="0" y="-1"/>
+            <a:ext cx="12192000" cy="6928153"/>
+          </a:xfrm>
+        </p:spPr>
+      </p:pic>
+      <p:sp>
+        <p:nvSpPr>
+          <p:cNvPr id="11" name="TextBox 10">
+            <a:extLst>
+              <a:ext uri="{FF2B5EF4-FFF2-40B4-BE49-F238E27FC236}">
+                <a16:creationId xmlns:a16="http://schemas.microsoft.com/office/drawing/2014/main" id="{0D3F7FDA-C0B3-43E6-9989-DB4204A6A65D}"/>
+              </a:ext>
+            </a:extLst>
+          </p:cNvPr>
+          <p:cNvSpPr txBox="1"/>
+          <p:nvPr/>
+        </p:nvSpPr>
+        <p:spPr>
+          <a:xfrm>
+            <a:off x="4151393" y="73057"/>
+            <a:ext cx="5076497" cy="707886"/>
+          </a:xfrm>
+          <a:prstGeom prst="rect">
+            <a:avLst/>
+          </a:prstGeom>
+          <a:noFill/>
+        </p:spPr>
+        <p:txBody>
+          <a:bodyPr wrap="square" rtlCol="0">
+            <a:spAutoFit/>
+          </a:bodyPr>
+          <a:lstStyle/>
+          <a:p>
+            <a:r>
+              <a:rPr lang="en-US" sz="4000" dirty="0"/>
+              <a:t>Portfolio</a:t>
+            </a:r>
+            <a:endParaRPr lang="en-AU" sz="4000" dirty="0"/>
+          </a:p>
+        </p:txBody>
+      </p:sp>
+      <p:sp>
+        <p:nvSpPr>
+          <p:cNvPr id="3" name="TextBox 2">
+            <a:extLst>
+              <a:ext uri="{FF2B5EF4-FFF2-40B4-BE49-F238E27FC236}">
+                <a16:creationId xmlns:a16="http://schemas.microsoft.com/office/drawing/2014/main" id="{E5952524-0357-4B17-B2DE-3FD5377EE1E9}"/>
+              </a:ext>
+            </a:extLst>
+          </p:cNvPr>
+          <p:cNvSpPr txBox="1"/>
+          <p:nvPr/>
+        </p:nvSpPr>
+        <p:spPr>
+          <a:xfrm>
+            <a:off x="3042834" y="811019"/>
+            <a:ext cx="4578136" cy="1200329"/>
+          </a:xfrm>
+          <a:prstGeom prst="rect">
+            <a:avLst/>
+          </a:prstGeom>
+          <a:noFill/>
+        </p:spPr>
+        <p:txBody>
+          <a:bodyPr wrap="square" rtlCol="0">
+            <a:spAutoFit/>
+          </a:bodyPr>
+          <a:lstStyle/>
+          <a:p>
+            <a:pPr marL="285750" indent="-285750">
+              <a:buFontTx/>
+              <a:buChar char="-"/>
+            </a:pPr>
+            <a:r>
+              <a:rPr lang="en-US" dirty="0"/>
+              <a:t>Design Process and Decisions</a:t>
+            </a:r>
+          </a:p>
+          <a:p>
+            <a:pPr marL="285750" indent="-285750">
+              <a:buFontTx/>
+              <a:buChar char="-"/>
+            </a:pPr>
+            <a:r>
+              <a:rPr lang="en-US" dirty="0"/>
+              <a:t>Decision making process / aesthetics</a:t>
+            </a:r>
+          </a:p>
+          <a:p>
+            <a:pPr marL="285750" indent="-285750">
+              <a:buFontTx/>
+              <a:buChar char="-"/>
+            </a:pPr>
+            <a:endParaRPr lang="en-US" dirty="0"/>
+          </a:p>
+          <a:p>
+            <a:pPr marL="285750" indent="-285750">
+              <a:buFontTx/>
+              <a:buChar char="-"/>
+            </a:pPr>
+            <a:endParaRPr lang="en-AU" dirty="0"/>
+          </a:p>
+        </p:txBody>
+      </p:sp>
+      <p:pic>
+        <p:nvPicPr>
+          <p:cNvPr id="6" name="Picture 5">
+            <a:extLst>
+              <a:ext uri="{FF2B5EF4-FFF2-40B4-BE49-F238E27FC236}">
+                <a16:creationId xmlns:a16="http://schemas.microsoft.com/office/drawing/2014/main" id="{B931DBF9-D31F-499F-A678-773B5849C0EC}"/>
+              </a:ext>
+            </a:extLst>
+          </p:cNvPr>
+          <p:cNvPicPr>
+            <a:picLocks noChangeAspect="1"/>
+          </p:cNvPicPr>
+          <p:nvPr/>
+        </p:nvPicPr>
+        <p:blipFill>
+          <a:blip r:embed="rId3">
+            <a:extLst>
+              <a:ext uri="{28A0092B-C50C-407E-A947-70E740481C1C}">
+                <a14:useLocalDpi xmlns:a14="http://schemas.microsoft.com/office/drawing/2010/main" val="0"/>
+              </a:ext>
+            </a:extLst>
+          </a:blip>
+          <a:stretch>
+            <a:fillRect/>
+          </a:stretch>
+        </p:blipFill>
+        <p:spPr>
+          <a:xfrm>
+            <a:off x="204263" y="2146469"/>
+            <a:ext cx="3501686" cy="1767889"/>
+          </a:xfrm>
+          <a:prstGeom prst="rect">
+            <a:avLst/>
+          </a:prstGeom>
+        </p:spPr>
+      </p:pic>
+      <p:pic>
+        <p:nvPicPr>
+          <p:cNvPr id="9" name="Picture 8">
+            <a:extLst>
+              <a:ext uri="{FF2B5EF4-FFF2-40B4-BE49-F238E27FC236}">
+                <a16:creationId xmlns:a16="http://schemas.microsoft.com/office/drawing/2014/main" id="{FB171E43-9C88-48C1-833D-D0803FD1AA8A}"/>
+              </a:ext>
+            </a:extLst>
+          </p:cNvPr>
+          <p:cNvPicPr>
+            <a:picLocks noChangeAspect="1"/>
+          </p:cNvPicPr>
+          <p:nvPr/>
+        </p:nvPicPr>
+        <p:blipFill>
+          <a:blip r:embed="rId4">
+            <a:extLst>
+              <a:ext uri="{28A0092B-C50C-407E-A947-70E740481C1C}">
+                <a14:useLocalDpi xmlns:a14="http://schemas.microsoft.com/office/drawing/2010/main" val="0"/>
+              </a:ext>
+            </a:extLst>
+          </a:blip>
+          <a:stretch>
+            <a:fillRect/>
+          </a:stretch>
+        </p:blipFill>
+        <p:spPr>
+          <a:xfrm>
+            <a:off x="2407393" y="3996191"/>
+            <a:ext cx="3488000" cy="2627546"/>
+          </a:xfrm>
+          <a:prstGeom prst="rect">
+            <a:avLst/>
+          </a:prstGeom>
+        </p:spPr>
+      </p:pic>
+      <p:pic>
+        <p:nvPicPr>
+          <p:cNvPr id="13" name="Picture 12">
+            <a:extLst>
+              <a:ext uri="{FF2B5EF4-FFF2-40B4-BE49-F238E27FC236}">
+                <a16:creationId xmlns:a16="http://schemas.microsoft.com/office/drawing/2014/main" id="{85053D6E-2A5D-41E7-8B16-2CFB9F24F2FB}"/>
+              </a:ext>
+            </a:extLst>
+          </p:cNvPr>
+          <p:cNvPicPr>
+            <a:picLocks noChangeAspect="1"/>
+          </p:cNvPicPr>
+          <p:nvPr/>
+        </p:nvPicPr>
+        <p:blipFill>
+          <a:blip r:embed="rId5">
+            <a:extLst>
+              <a:ext uri="{28A0092B-C50C-407E-A947-70E740481C1C}">
+                <a14:useLocalDpi xmlns:a14="http://schemas.microsoft.com/office/drawing/2010/main" val="0"/>
+              </a:ext>
+            </a:extLst>
+          </a:blip>
+          <a:stretch>
+            <a:fillRect/>
+          </a:stretch>
+        </p:blipFill>
+        <p:spPr>
+          <a:xfrm rot="10800000">
+            <a:off x="204263" y="3996191"/>
+            <a:ext cx="2099595" cy="2788752"/>
+          </a:xfrm>
+          <a:prstGeom prst="rect">
+            <a:avLst/>
+          </a:prstGeom>
+        </p:spPr>
+      </p:pic>
+      <p:pic>
+        <p:nvPicPr>
+          <p:cNvPr id="15" name="Picture 14">
+            <a:extLst>
+              <a:ext uri="{FF2B5EF4-FFF2-40B4-BE49-F238E27FC236}">
+                <a16:creationId xmlns:a16="http://schemas.microsoft.com/office/drawing/2014/main" id="{07E1F048-8582-406E-B368-91B76DB10933}"/>
+              </a:ext>
+            </a:extLst>
+          </p:cNvPr>
+          <p:cNvPicPr>
+            <a:picLocks noChangeAspect="1"/>
+          </p:cNvPicPr>
+          <p:nvPr/>
+        </p:nvPicPr>
+        <p:blipFill>
+          <a:blip r:embed="rId6">
+            <a:extLst>
+              <a:ext uri="{28A0092B-C50C-407E-A947-70E740481C1C}">
+                <a14:useLocalDpi xmlns:a14="http://schemas.microsoft.com/office/drawing/2010/main" val="0"/>
+              </a:ext>
+            </a:extLst>
+          </a:blip>
+          <a:stretch>
+            <a:fillRect/>
+          </a:stretch>
+        </p:blipFill>
+        <p:spPr>
+          <a:xfrm>
+            <a:off x="7757831" y="311577"/>
+            <a:ext cx="4040235" cy="3063875"/>
+          </a:xfrm>
+          <a:prstGeom prst="rect">
+            <a:avLst/>
+          </a:prstGeom>
+        </p:spPr>
+      </p:pic>
+      <p:pic>
+        <p:nvPicPr>
+          <p:cNvPr id="17" name="Picture 16">
+            <a:extLst>
+              <a:ext uri="{FF2B5EF4-FFF2-40B4-BE49-F238E27FC236}">
+                <a16:creationId xmlns:a16="http://schemas.microsoft.com/office/drawing/2014/main" id="{3F8860EC-38F9-418D-A308-8E090556E31A}"/>
+              </a:ext>
+            </a:extLst>
+          </p:cNvPr>
+          <p:cNvPicPr>
+            <a:picLocks noChangeAspect="1"/>
+          </p:cNvPicPr>
+          <p:nvPr/>
+        </p:nvPicPr>
+        <p:blipFill>
+          <a:blip r:embed="rId7">
+            <a:extLst>
+              <a:ext uri="{28A0092B-C50C-407E-A947-70E740481C1C}">
+                <a14:useLocalDpi xmlns:a14="http://schemas.microsoft.com/office/drawing/2010/main" val="0"/>
+              </a:ext>
+            </a:extLst>
+          </a:blip>
+          <a:stretch>
+            <a:fillRect/>
+          </a:stretch>
+        </p:blipFill>
+        <p:spPr>
+          <a:xfrm>
+            <a:off x="8294131" y="3429000"/>
+            <a:ext cx="2644518" cy="3295954"/>
+          </a:xfrm>
+          <a:prstGeom prst="rect">
+            <a:avLst/>
+          </a:prstGeom>
+        </p:spPr>
+      </p:pic>
+      <p:sp>
+        <p:nvSpPr>
+          <p:cNvPr id="18" name="TextBox 17">
+            <a:extLst>
+              <a:ext uri="{FF2B5EF4-FFF2-40B4-BE49-F238E27FC236}">
+                <a16:creationId xmlns:a16="http://schemas.microsoft.com/office/drawing/2014/main" id="{2A180BAE-DED6-41E5-A5B1-D2CB23C1B067}"/>
+              </a:ext>
+            </a:extLst>
+          </p:cNvPr>
+          <p:cNvSpPr txBox="1"/>
+          <p:nvPr/>
+        </p:nvSpPr>
+        <p:spPr>
+          <a:xfrm>
+            <a:off x="3997578" y="2199345"/>
+            <a:ext cx="3314809" cy="1200329"/>
+          </a:xfrm>
+          <a:prstGeom prst="rect">
+            <a:avLst/>
+          </a:prstGeom>
+          <a:noFill/>
+        </p:spPr>
+        <p:txBody>
+          <a:bodyPr wrap="square" rtlCol="0">
+            <a:spAutoFit/>
+          </a:bodyPr>
+          <a:lstStyle/>
+          <a:p>
+            <a:pPr marL="285750" indent="-285750">
+              <a:buFontTx/>
+              <a:buChar char="-"/>
+            </a:pPr>
+            <a:r>
+              <a:rPr lang="en-US" dirty="0"/>
+              <a:t>Development/build Process</a:t>
+            </a:r>
+          </a:p>
+          <a:p>
+            <a:pPr marL="285750" indent="-285750">
+              <a:buFontTx/>
+              <a:buChar char="-"/>
+            </a:pPr>
+            <a:r>
+              <a:rPr lang="en-US" dirty="0"/>
+              <a:t>List of components</a:t>
+            </a:r>
+          </a:p>
+          <a:p>
+            <a:pPr marL="285750" indent="-285750">
+              <a:buFontTx/>
+              <a:buChar char="-"/>
+            </a:pPr>
+            <a:r>
+              <a:rPr lang="en-US" dirty="0"/>
+              <a:t>How components and styling will engage the audience</a:t>
+            </a:r>
+          </a:p>
+        </p:txBody>
+      </p:sp>
+    </p:spTree>
+    <p:extLst>
+      <p:ext uri="{BB962C8B-B14F-4D97-AF65-F5344CB8AC3E}">
+        <p14:creationId xmlns:p14="http://schemas.microsoft.com/office/powerpoint/2010/main" val="4079234789"/>
+      </p:ext>
+    </p:extLst>
+  </p:cSld>
+  <p:clrMapOvr>
+    <a:masterClrMapping/>
+  </p:clrMapOvr>
+</p:sld>
+</file>
+
+<file path=ppt/slides/slide3.xml><?xml version="1.0" encoding="utf-8"?>
+<p:sld xmlns:a="http://schemas.openxmlformats.org/drawingml/2006/main" xmlns:r="http://schemas.openxmlformats.org/officeDocument/2006/relationships" xmlns:p="http://schemas.openxmlformats.org/presentationml/2006/main">
+  <p:cSld>
+    <p:spTree>
+      <p:nvGrpSpPr>
+        <p:cNvPr id="1" name=""/>
+        <p:cNvGrpSpPr/>
+        <p:nvPr/>
+      </p:nvGrpSpPr>
+      <p:grpSpPr>
+        <a:xfrm>
+          <a:off x="0" y="0"/>
+          <a:ext cx="0" cy="0"/>
+          <a:chOff x="0" y="0"/>
+          <a:chExt cx="0" cy="0"/>
+        </a:xfrm>
+      </p:grpSpPr>
+      <p:sp>
+        <p:nvSpPr>
+          <p:cNvPr id="2" name="Title 1">
+            <a:extLst>
+              <a:ext uri="{FF2B5EF4-FFF2-40B4-BE49-F238E27FC236}">
+                <a16:creationId xmlns:a16="http://schemas.microsoft.com/office/drawing/2014/main" id="{C1F7AA57-5FB3-4548-95C8-BA8369D68675}"/>
+              </a:ext>
+            </a:extLst>
+          </p:cNvPr>
+          <p:cNvSpPr>
+            <a:spLocks noGrp="1"/>
+          </p:cNvSpPr>
+          <p:nvPr>
+            <p:ph type="title"/>
+          </p:nvPr>
+        </p:nvSpPr>
+        <p:spPr/>
+        <p:txBody>
+          <a:bodyPr/>
+          <a:lstStyle/>
+          <a:p>
+            <a:endParaRPr lang="en-AU"/>
+          </a:p>
+        </p:txBody>
+      </p:sp>
+      <p:pic>
+        <p:nvPicPr>
+          <p:cNvPr id="5" name="Content Placeholder 4">
+            <a:extLst>
+              <a:ext uri="{FF2B5EF4-FFF2-40B4-BE49-F238E27FC236}">
+                <a16:creationId xmlns:a16="http://schemas.microsoft.com/office/drawing/2014/main" id="{97C232E3-984B-4594-B306-2337DB535BA7}"/>
+              </a:ext>
+            </a:extLst>
+          </p:cNvPr>
+          <p:cNvPicPr>
+            <a:picLocks noGrp="1" noChangeAspect="1"/>
+          </p:cNvPicPr>
+          <p:nvPr>
+            <p:ph idx="1"/>
+          </p:nvPr>
+        </p:nvPicPr>
+        <p:blipFill>
+          <a:blip r:embed="rId2">
+            <a:extLst>
+              <a:ext uri="{28A0092B-C50C-407E-A947-70E740481C1C}">
+                <a14:useLocalDpi xmlns:a14="http://schemas.microsoft.com/office/drawing/2010/main" val="0"/>
+              </a:ext>
+            </a:extLst>
+          </a:blip>
+          <a:stretch>
+            <a:fillRect/>
+          </a:stretch>
+        </p:blipFill>
+        <p:spPr>
+          <a:xfrm>
+            <a:off x="0" y="-1"/>
+            <a:ext cx="12192000" cy="6928153"/>
+          </a:xfrm>
+        </p:spPr>
+      </p:pic>
+      <p:sp>
+        <p:nvSpPr>
+          <p:cNvPr id="11" name="TextBox 10">
+            <a:extLst>
+              <a:ext uri="{FF2B5EF4-FFF2-40B4-BE49-F238E27FC236}">
+                <a16:creationId xmlns:a16="http://schemas.microsoft.com/office/drawing/2014/main" id="{0D3F7FDA-C0B3-43E6-9989-DB4204A6A65D}"/>
+              </a:ext>
+            </a:extLst>
+          </p:cNvPr>
+          <p:cNvSpPr txBox="1"/>
+          <p:nvPr/>
+        </p:nvSpPr>
+        <p:spPr>
+          <a:xfrm>
+            <a:off x="4158155" y="94377"/>
+            <a:ext cx="5076497" cy="707886"/>
+          </a:xfrm>
+          <a:prstGeom prst="rect">
+            <a:avLst/>
+          </a:prstGeom>
+          <a:noFill/>
+        </p:spPr>
+        <p:txBody>
+          <a:bodyPr wrap="square" rtlCol="0">
+            <a:spAutoFit/>
+          </a:bodyPr>
+          <a:lstStyle/>
+          <a:p>
+            <a:r>
+              <a:rPr lang="en-US" sz="4000" dirty="0"/>
+              <a:t>Portfolio</a:t>
+            </a:r>
+            <a:endParaRPr lang="en-AU" sz="4000" dirty="0"/>
+          </a:p>
+        </p:txBody>
+      </p:sp>
+      <p:sp>
+        <p:nvSpPr>
+          <p:cNvPr id="3" name="TextBox 2">
+            <a:extLst>
+              <a:ext uri="{FF2B5EF4-FFF2-40B4-BE49-F238E27FC236}">
+                <a16:creationId xmlns:a16="http://schemas.microsoft.com/office/drawing/2014/main" id="{2947FA4F-D272-4AB6-AFBF-34DB8423699A}"/>
+              </a:ext>
+            </a:extLst>
+          </p:cNvPr>
+          <p:cNvSpPr txBox="1"/>
+          <p:nvPr/>
+        </p:nvSpPr>
+        <p:spPr>
+          <a:xfrm>
+            <a:off x="4795754" y="1993404"/>
+            <a:ext cx="3462017" cy="1200329"/>
+          </a:xfrm>
+          <a:prstGeom prst="rect">
+            <a:avLst/>
+          </a:prstGeom>
+          <a:noFill/>
+        </p:spPr>
+        <p:txBody>
+          <a:bodyPr wrap="square" rtlCol="0">
+            <a:spAutoFit/>
+          </a:bodyPr>
+          <a:lstStyle/>
+          <a:p>
+            <a:pPr marL="285750" indent="-285750">
+              <a:buFontTx/>
+              <a:buChar char="-"/>
+            </a:pPr>
+            <a:r>
+              <a:rPr lang="en-US" dirty="0"/>
+              <a:t>Challenges</a:t>
+            </a:r>
+          </a:p>
+          <a:p>
+            <a:pPr marL="285750" indent="-285750">
+              <a:buFontTx/>
+              <a:buChar char="-"/>
+            </a:pPr>
+            <a:r>
+              <a:rPr lang="en-US" dirty="0"/>
+              <a:t>Ethical issues</a:t>
+            </a:r>
+          </a:p>
+          <a:p>
+            <a:pPr marL="285750" indent="-285750">
+              <a:buFontTx/>
+              <a:buChar char="-"/>
+            </a:pPr>
+            <a:r>
+              <a:rPr lang="en-US" dirty="0"/>
+              <a:t>Favorite part</a:t>
+            </a:r>
+          </a:p>
+          <a:p>
+            <a:endParaRPr lang="en-AU" dirty="0"/>
+          </a:p>
+        </p:txBody>
+      </p:sp>
+    </p:spTree>
+    <p:extLst>
+      <p:ext uri="{BB962C8B-B14F-4D97-AF65-F5344CB8AC3E}">
+        <p14:creationId xmlns:p14="http://schemas.microsoft.com/office/powerpoint/2010/main" val="1919871850"/>
       </p:ext>
     </p:extLst>
   </p:cSld>

</xml_diff>